<commit_message>
now record the using of scores, show on /teamScore password now read from a txt file, at ../csv/key.txt history size of score changes to maximum 500 lines
</commit_message>
<xml_diff>
--- a/FileSearchSystem/readme/使用說明.pptx
+++ b/FileSearchSystem/readme/使用說明.pptx
@@ -12,6 +12,9 @@
     <p:sldId id="260" r:id="rId6"/>
     <p:sldId id="261" r:id="rId7"/>
     <p:sldId id="262" r:id="rId8"/>
+    <p:sldId id="263" r:id="rId9"/>
+    <p:sldId id="264" r:id="rId10"/>
+    <p:sldId id="265" r:id="rId11"/>
   </p:sldIdLst>
   <p:sldSz cx="12192000" cy="6858000"/>
   <p:notesSz cx="6858000" cy="9144000"/>
@@ -110,6 +113,11 @@
       </a:defRPr>
     </a:lvl9pPr>
   </p:defaultTextStyle>
+  <p:extLst>
+    <p:ext uri="{EFAFB233-063F-42B5-8137-9DF3F51BA10A}">
+      <p15:sldGuideLst xmlns:p15="http://schemas.microsoft.com/office/powerpoint/2012/main"/>
+    </p:ext>
+  </p:extLst>
 </p:presentation>
 </file>
 
@@ -346,7 +354,7 @@
           <a:p>
             <a:fld id="{94B9A1F8-7153-4015-A37A-B7EE01D748AD}" type="datetimeFigureOut">
               <a:rPr lang="zh-TW" altLang="en-US" smtClean="0"/>
-              <a:t>2020/1/15</a:t>
+              <a:t>2020/1/27</a:t>
             </a:fld>
             <a:endParaRPr lang="zh-TW" altLang="en-US"/>
           </a:p>
@@ -680,7 +688,7 @@
           <a:p>
             <a:fld id="{94B9A1F8-7153-4015-A37A-B7EE01D748AD}" type="datetimeFigureOut">
               <a:rPr lang="zh-TW" altLang="en-US" smtClean="0"/>
-              <a:t>2020/1/15</a:t>
+              <a:t>2020/1/27</a:t>
             </a:fld>
             <a:endParaRPr lang="zh-TW" altLang="en-US"/>
           </a:p>
@@ -958,7 +966,7 @@
           <a:p>
             <a:fld id="{94B9A1F8-7153-4015-A37A-B7EE01D748AD}" type="datetimeFigureOut">
               <a:rPr lang="zh-TW" altLang="en-US" smtClean="0"/>
-              <a:t>2020/1/15</a:t>
+              <a:t>2020/1/27</a:t>
             </a:fld>
             <a:endParaRPr lang="zh-TW" altLang="en-US"/>
           </a:p>
@@ -1526,7 +1534,7 @@
           <a:p>
             <a:fld id="{94B9A1F8-7153-4015-A37A-B7EE01D748AD}" type="datetimeFigureOut">
               <a:rPr lang="zh-TW" altLang="en-US" smtClean="0"/>
-              <a:t>2020/1/15</a:t>
+              <a:t>2020/1/27</a:t>
             </a:fld>
             <a:endParaRPr lang="zh-TW" altLang="en-US"/>
           </a:p>
@@ -1804,7 +1812,7 @@
           <a:p>
             <a:fld id="{94B9A1F8-7153-4015-A37A-B7EE01D748AD}" type="datetimeFigureOut">
               <a:rPr lang="zh-TW" altLang="en-US" smtClean="0"/>
-              <a:t>2020/1/15</a:t>
+              <a:t>2020/1/27</a:t>
             </a:fld>
             <a:endParaRPr lang="zh-TW" altLang="en-US"/>
           </a:p>
@@ -2366,7 +2374,7 @@
           <a:p>
             <a:fld id="{94B9A1F8-7153-4015-A37A-B7EE01D748AD}" type="datetimeFigureOut">
               <a:rPr lang="zh-TW" altLang="en-US" smtClean="0"/>
-              <a:t>2020/1/15</a:t>
+              <a:t>2020/1/27</a:t>
             </a:fld>
             <a:endParaRPr lang="zh-TW" altLang="en-US"/>
           </a:p>
@@ -2693,7 +2701,7 @@
           <a:p>
             <a:fld id="{94B9A1F8-7153-4015-A37A-B7EE01D748AD}" type="datetimeFigureOut">
               <a:rPr lang="zh-TW" altLang="en-US" smtClean="0"/>
-              <a:t>2020/1/15</a:t>
+              <a:t>2020/1/27</a:t>
             </a:fld>
             <a:endParaRPr lang="zh-TW" altLang="en-US"/>
           </a:p>
@@ -2870,7 +2878,7 @@
           <a:p>
             <a:fld id="{94B9A1F8-7153-4015-A37A-B7EE01D748AD}" type="datetimeFigureOut">
               <a:rPr lang="zh-TW" altLang="en-US" smtClean="0"/>
-              <a:t>2020/1/15</a:t>
+              <a:t>2020/1/27</a:t>
             </a:fld>
             <a:endParaRPr lang="zh-TW" altLang="en-US"/>
           </a:p>
@@ -3108,7 +3116,7 @@
           <a:p>
             <a:fld id="{94B9A1F8-7153-4015-A37A-B7EE01D748AD}" type="datetimeFigureOut">
               <a:rPr lang="zh-TW" altLang="en-US" smtClean="0"/>
-              <a:t>2020/1/15</a:t>
+              <a:t>2020/1/27</a:t>
             </a:fld>
             <a:endParaRPr lang="zh-TW" altLang="en-US"/>
           </a:p>
@@ -3354,7 +3362,7 @@
             <a:fld id="{94B9A1F8-7153-4015-A37A-B7EE01D748AD}" type="datetimeFigureOut">
               <a:rPr lang="zh-TW" altLang="en-US" smtClean="0"/>
               <a:pPr/>
-              <a:t>2020/1/15</a:t>
+              <a:t>2020/1/27</a:t>
             </a:fld>
             <a:endParaRPr lang="zh-TW" altLang="en-US"/>
           </a:p>
@@ -3645,7 +3653,7 @@
           <a:p>
             <a:fld id="{94B9A1F8-7153-4015-A37A-B7EE01D748AD}" type="datetimeFigureOut">
               <a:rPr lang="zh-TW" altLang="en-US" smtClean="0"/>
-              <a:t>2020/1/15</a:t>
+              <a:t>2020/1/27</a:t>
             </a:fld>
             <a:endParaRPr lang="zh-TW" altLang="en-US"/>
           </a:p>
@@ -3911,7 +3919,7 @@
           <a:p>
             <a:fld id="{94B9A1F8-7153-4015-A37A-B7EE01D748AD}" type="datetimeFigureOut">
               <a:rPr lang="zh-TW" altLang="en-US" smtClean="0"/>
-              <a:t>2020/1/15</a:t>
+              <a:t>2020/1/27</a:t>
             </a:fld>
             <a:endParaRPr lang="zh-TW" altLang="en-US"/>
           </a:p>
@@ -4285,7 +4293,7 @@
           <a:p>
             <a:fld id="{94B9A1F8-7153-4015-A37A-B7EE01D748AD}" type="datetimeFigureOut">
               <a:rPr lang="zh-TW" altLang="en-US" smtClean="0"/>
-              <a:t>2020/1/15</a:t>
+              <a:t>2020/1/27</a:t>
             </a:fld>
             <a:endParaRPr lang="zh-TW" altLang="en-US"/>
           </a:p>
@@ -4433,7 +4441,7 @@
           <a:p>
             <a:fld id="{94B9A1F8-7153-4015-A37A-B7EE01D748AD}" type="datetimeFigureOut">
               <a:rPr lang="zh-TW" altLang="en-US" smtClean="0"/>
-              <a:t>2020/1/15</a:t>
+              <a:t>2020/1/27</a:t>
             </a:fld>
             <a:endParaRPr lang="zh-TW" altLang="en-US"/>
           </a:p>
@@ -4558,7 +4566,7 @@
           <a:p>
             <a:fld id="{94B9A1F8-7153-4015-A37A-B7EE01D748AD}" type="datetimeFigureOut">
               <a:rPr lang="zh-TW" altLang="en-US" smtClean="0"/>
-              <a:t>2020/1/15</a:t>
+              <a:t>2020/1/27</a:t>
             </a:fld>
             <a:endParaRPr lang="zh-TW" altLang="en-US"/>
           </a:p>
@@ -4843,7 +4851,7 @@
           <a:p>
             <a:fld id="{94B9A1F8-7153-4015-A37A-B7EE01D748AD}" type="datetimeFigureOut">
               <a:rPr lang="zh-TW" altLang="en-US" smtClean="0"/>
-              <a:t>2020/1/15</a:t>
+              <a:t>2020/1/27</a:t>
             </a:fld>
             <a:endParaRPr lang="zh-TW" altLang="en-US"/>
           </a:p>
@@ -5167,7 +5175,7 @@
           <a:p>
             <a:fld id="{94B9A1F8-7153-4015-A37A-B7EE01D748AD}" type="datetimeFigureOut">
               <a:rPr lang="zh-TW" altLang="en-US" smtClean="0"/>
-              <a:t>2020/1/15</a:t>
+              <a:t>2020/1/27</a:t>
             </a:fld>
             <a:endParaRPr lang="zh-TW" altLang="en-US"/>
           </a:p>
@@ -5383,7 +5391,7 @@
             <a:fld id="{94B9A1F8-7153-4015-A37A-B7EE01D748AD}" type="datetimeFigureOut">
               <a:rPr lang="zh-TW" altLang="en-US" smtClean="0"/>
               <a:pPr/>
-              <a:t>2020/1/15</a:t>
+              <a:t>2020/1/27</a:t>
             </a:fld>
             <a:endParaRPr lang="zh-TW" altLang="en-US"/>
           </a:p>
@@ -5977,6 +5985,117 @@
 </p:sld>
 </file>
 
+<file path=ppt/slides/slide10.xml><?xml version="1.0" encoding="utf-8"?>
+<p:sld xmlns:a="http://schemas.openxmlformats.org/drawingml/2006/main" xmlns:r="http://schemas.openxmlformats.org/officeDocument/2006/relationships" xmlns:p="http://schemas.openxmlformats.org/presentationml/2006/main">
+  <p:cSld>
+    <p:spTree>
+      <p:nvGrpSpPr>
+        <p:cNvPr id="1" name=""/>
+        <p:cNvGrpSpPr/>
+        <p:nvPr/>
+      </p:nvGrpSpPr>
+      <p:grpSpPr>
+        <a:xfrm>
+          <a:off x="0" y="0"/>
+          <a:ext cx="0" cy="0"/>
+          <a:chOff x="0" y="0"/>
+          <a:chExt cx="0" cy="0"/>
+        </a:xfrm>
+      </p:grpSpPr>
+      <p:sp>
+        <p:nvSpPr>
+          <p:cNvPr id="2" name="標題 1">
+            <a:extLst>
+              <a:ext uri="{FF2B5EF4-FFF2-40B4-BE49-F238E27FC236}">
+                <a16:creationId xmlns:a16="http://schemas.microsoft.com/office/drawing/2014/main" id="{4A67553B-858D-4EA3-8761-4A54DDD1A470}"/>
+              </a:ext>
+            </a:extLst>
+          </p:cNvPr>
+          <p:cNvSpPr>
+            <a:spLocks noGrp="1"/>
+          </p:cNvSpPr>
+          <p:nvPr>
+            <p:ph type="title"/>
+          </p:nvPr>
+        </p:nvSpPr>
+        <p:spPr/>
+        <p:txBody>
+          <a:bodyPr/>
+          <a:lstStyle/>
+          <a:p>
+            <a:r>
+              <a:rPr lang="zh-TW" altLang="en-US" dirty="0"/>
+              <a:t>附錄</a:t>
+            </a:r>
+            <a:r>
+              <a:rPr lang="en-US" altLang="zh-TW" dirty="0"/>
+              <a:t>:</a:t>
+            </a:r>
+            <a:r>
+              <a:rPr lang="zh-TW" altLang="en-US" dirty="0"/>
+              <a:t> 消費時機</a:t>
+            </a:r>
+          </a:p>
+        </p:txBody>
+      </p:sp>
+      <p:sp>
+        <p:nvSpPr>
+          <p:cNvPr id="3" name="內容版面配置區 2">
+            <a:extLst>
+              <a:ext uri="{FF2B5EF4-FFF2-40B4-BE49-F238E27FC236}">
+                <a16:creationId xmlns:a16="http://schemas.microsoft.com/office/drawing/2014/main" id="{83444514-FE6A-4576-A291-598627DB08F7}"/>
+              </a:ext>
+            </a:extLst>
+          </p:cNvPr>
+          <p:cNvSpPr>
+            <a:spLocks noGrp="1"/>
+          </p:cNvSpPr>
+          <p:nvPr>
+            <p:ph idx="1"/>
+          </p:nvPr>
+        </p:nvSpPr>
+        <p:spPr/>
+        <p:txBody>
+          <a:bodyPr anchor="t">
+            <a:normAutofit/>
+          </a:bodyPr>
+          <a:lstStyle/>
+          <a:p>
+            <a:r>
+              <a:rPr lang="zh-TW" altLang="en-US" sz="3600" dirty="0"/>
+              <a:t>黑客松有推銷員販售零食</a:t>
+            </a:r>
+            <a:endParaRPr lang="en-US" altLang="zh-TW" sz="3600" dirty="0"/>
+          </a:p>
+          <a:p>
+            <a:r>
+              <a:rPr lang="zh-TW" altLang="en-US" sz="3600" dirty="0"/>
+              <a:t>最後會根據 贏得</a:t>
+            </a:r>
+            <a:r>
+              <a:rPr lang="en-US" altLang="zh-TW" sz="3600" dirty="0"/>
+              <a:t>/</a:t>
+            </a:r>
+            <a:r>
+              <a:rPr lang="zh-TW" altLang="en-US" sz="3600" dirty="0"/>
+              <a:t>消費 點數最多的小隊進行頒獎</a:t>
+            </a:r>
+          </a:p>
+        </p:txBody>
+      </p:sp>
+    </p:spTree>
+    <p:extLst>
+      <p:ext uri="{BB962C8B-B14F-4D97-AF65-F5344CB8AC3E}">
+        <p14:creationId xmlns:p14="http://schemas.microsoft.com/office/powerpoint/2010/main" val="2564526823"/>
+      </p:ext>
+    </p:extLst>
+  </p:cSld>
+  <p:clrMapOvr>
+    <a:masterClrMapping/>
+  </p:clrMapOvr>
+</p:sld>
+</file>
+
 <file path=ppt/slides/slide2.xml><?xml version="1.0" encoding="utf-8"?>
 <p:sld xmlns:a="http://schemas.openxmlformats.org/drawingml/2006/main" xmlns:r="http://schemas.openxmlformats.org/officeDocument/2006/relationships" xmlns:p="http://schemas.openxmlformats.org/presentationml/2006/main">
   <p:cSld>
@@ -6037,36 +6156,28 @@
       </p:sp>
       <p:pic>
         <p:nvPicPr>
-          <p:cNvPr id="4" name="內容版面配置區 3" descr="一張含有 文字 的圖片&#10;&#10;自動產生的描述">
+          <p:cNvPr id="6" name="圖片 5">
             <a:extLst>
               <a:ext uri="{FF2B5EF4-FFF2-40B4-BE49-F238E27FC236}">
-                <a16:creationId xmlns:a16="http://schemas.microsoft.com/office/drawing/2014/main" id="{8413BE94-0C6F-4A27-9622-66DF10BFBDC6}"/>
+                <a16:creationId xmlns:a16="http://schemas.microsoft.com/office/drawing/2014/main" id="{3CBEC2B2-3058-4F08-AD02-607CB1602055}"/>
               </a:ext>
             </a:extLst>
           </p:cNvPr>
           <p:cNvPicPr>
-            <a:picLocks noGrp="1" noChangeAspect="1"/>
+            <a:picLocks noChangeAspect="1"/>
           </p:cNvPicPr>
-          <p:nvPr>
-            <p:ph idx="1"/>
-          </p:nvPr>
+          <p:nvPr/>
         </p:nvPicPr>
         <p:blipFill>
-          <a:blip r:embed="rId2">
-            <a:extLst>
-              <a:ext uri="{28A0092B-C50C-407E-A947-70E740481C1C}">
-                <a14:useLocalDpi xmlns:a14="http://schemas.microsoft.com/office/drawing/2010/main" val="0"/>
-              </a:ext>
-            </a:extLst>
-          </a:blip>
+          <a:blip r:embed="rId2"/>
           <a:stretch>
             <a:fillRect/>
           </a:stretch>
         </p:blipFill>
         <p:spPr>
           <a:xfrm>
-            <a:off x="3926681" y="2141538"/>
-            <a:ext cx="3649662" cy="3649662"/>
+            <a:off x="3818281" y="2142067"/>
+            <a:ext cx="3600614" cy="3600614"/>
           </a:xfrm>
           <a:prstGeom prst="rect">
             <a:avLst/>
@@ -8109,6 +8220,681 @@
     <p:extLst>
       <p:ext uri="{BB962C8B-B14F-4D97-AF65-F5344CB8AC3E}">
         <p14:creationId xmlns:p14="http://schemas.microsoft.com/office/powerpoint/2010/main" val="3049057028"/>
+      </p:ext>
+    </p:extLst>
+  </p:cSld>
+  <p:clrMapOvr>
+    <a:masterClrMapping/>
+  </p:clrMapOvr>
+</p:sld>
+</file>
+
+<file path=ppt/slides/slide8.xml><?xml version="1.0" encoding="utf-8"?>
+<p:sld xmlns:a="http://schemas.openxmlformats.org/drawingml/2006/main" xmlns:r="http://schemas.openxmlformats.org/officeDocument/2006/relationships" xmlns:p="http://schemas.openxmlformats.org/presentationml/2006/main">
+  <p:cSld>
+    <p:spTree>
+      <p:nvGrpSpPr>
+        <p:cNvPr id="1" name=""/>
+        <p:cNvGrpSpPr/>
+        <p:nvPr/>
+      </p:nvGrpSpPr>
+      <p:grpSpPr>
+        <a:xfrm>
+          <a:off x="0" y="0"/>
+          <a:ext cx="0" cy="0"/>
+          <a:chOff x="0" y="0"/>
+          <a:chExt cx="0" cy="0"/>
+        </a:xfrm>
+      </p:grpSpPr>
+      <p:sp>
+        <p:nvSpPr>
+          <p:cNvPr id="2" name="標題 1">
+            <a:extLst>
+              <a:ext uri="{FF2B5EF4-FFF2-40B4-BE49-F238E27FC236}">
+                <a16:creationId xmlns:a16="http://schemas.microsoft.com/office/drawing/2014/main" id="{311677EB-44F3-4D96-9529-C9FD309988FA}"/>
+              </a:ext>
+            </a:extLst>
+          </p:cNvPr>
+          <p:cNvSpPr>
+            <a:spLocks noGrp="1"/>
+          </p:cNvSpPr>
+          <p:nvPr>
+            <p:ph type="title"/>
+          </p:nvPr>
+        </p:nvSpPr>
+        <p:spPr/>
+        <p:txBody>
+          <a:bodyPr/>
+          <a:lstStyle/>
+          <a:p>
+            <a:r>
+              <a:rPr lang="zh-TW" altLang="en-US" dirty="0"/>
+              <a:t>緊急模式</a:t>
+            </a:r>
+            <a:r>
+              <a:rPr lang="en-US" altLang="zh-TW" dirty="0"/>
+              <a:t>(</a:t>
+            </a:r>
+            <a:r>
+              <a:rPr lang="zh-TW" altLang="en-US" dirty="0"/>
+              <a:t>直接設置分數</a:t>
+            </a:r>
+            <a:r>
+              <a:rPr lang="en-US" altLang="zh-TW" dirty="0"/>
+              <a:t>)</a:t>
+            </a:r>
+            <a:endParaRPr lang="zh-TW" altLang="en-US" dirty="0"/>
+          </a:p>
+        </p:txBody>
+      </p:sp>
+      <p:pic>
+        <p:nvPicPr>
+          <p:cNvPr id="5" name="內容版面配置區 4" descr="一張含有 文字, 螢幕擷取畫面 的圖片&#10;&#10;自動產生的描述">
+            <a:extLst>
+              <a:ext uri="{FF2B5EF4-FFF2-40B4-BE49-F238E27FC236}">
+                <a16:creationId xmlns:a16="http://schemas.microsoft.com/office/drawing/2014/main" id="{05489168-62E9-4381-8F18-47F31B9AF0D6}"/>
+              </a:ext>
+            </a:extLst>
+          </p:cNvPr>
+          <p:cNvPicPr>
+            <a:picLocks noGrp="1" noChangeAspect="1"/>
+          </p:cNvPicPr>
+          <p:nvPr>
+            <p:ph idx="1"/>
+          </p:nvPr>
+        </p:nvPicPr>
+        <p:blipFill rotWithShape="1">
+          <a:blip r:embed="rId2">
+            <a:extLst>
+              <a:ext uri="{28A0092B-C50C-407E-A947-70E740481C1C}">
+                <a14:useLocalDpi xmlns:a14="http://schemas.microsoft.com/office/drawing/2010/main" val="0"/>
+              </a:ext>
+            </a:extLst>
+          </a:blip>
+          <a:srcRect l="261" t="8508" r="261" b="40086"/>
+          <a:stretch/>
+        </p:blipFill>
+        <p:spPr>
+          <a:xfrm>
+            <a:off x="2100321" y="2012240"/>
+            <a:ext cx="3717550" cy="4268990"/>
+          </a:xfrm>
+        </p:spPr>
+      </p:pic>
+      <p:sp>
+        <p:nvSpPr>
+          <p:cNvPr id="6" name="文字方塊 5">
+            <a:extLst>
+              <a:ext uri="{FF2B5EF4-FFF2-40B4-BE49-F238E27FC236}">
+                <a16:creationId xmlns:a16="http://schemas.microsoft.com/office/drawing/2014/main" id="{94561521-C376-4B89-81B0-E4730A8657C3}"/>
+              </a:ext>
+            </a:extLst>
+          </p:cNvPr>
+          <p:cNvSpPr txBox="1"/>
+          <p:nvPr/>
+        </p:nvSpPr>
+        <p:spPr>
+          <a:xfrm>
+            <a:off x="688218" y="1881201"/>
+            <a:ext cx="3847848" cy="369332"/>
+          </a:xfrm>
+          <a:prstGeom prst="rect">
+            <a:avLst/>
+          </a:prstGeom>
+          <a:ln/>
+          <a:effectLst>
+            <a:outerShdw blurRad="63500" sx="102000" sy="102000" algn="ctr" rotWithShape="0">
+              <a:prstClr val="black">
+                <a:alpha val="40000"/>
+              </a:prstClr>
+            </a:outerShdw>
+          </a:effectLst>
+        </p:spPr>
+        <p:style>
+          <a:lnRef idx="2">
+            <a:schemeClr val="accent6"/>
+          </a:lnRef>
+          <a:fillRef idx="1">
+            <a:schemeClr val="lt1"/>
+          </a:fillRef>
+          <a:effectRef idx="0">
+            <a:schemeClr val="accent6"/>
+          </a:effectRef>
+          <a:fontRef idx="minor">
+            <a:schemeClr val="dk1"/>
+          </a:fontRef>
+        </p:style>
+        <p:txBody>
+          <a:bodyPr wrap="none" rtlCol="0">
+            <a:spAutoFit/>
+          </a:bodyPr>
+          <a:lstStyle/>
+          <a:p>
+            <a:r>
+              <a:rPr lang="en-US" altLang="zh-TW" dirty="0">
+                <a:solidFill>
+                  <a:schemeClr val="bg1"/>
+                </a:solidFill>
+              </a:rPr>
+              <a:t>http://nckuvincent.ddns.net:11230/set</a:t>
+            </a:r>
+            <a:endParaRPr lang="zh-TW" altLang="en-US" dirty="0">
+              <a:solidFill>
+                <a:schemeClr val="bg1"/>
+              </a:solidFill>
+            </a:endParaRPr>
+          </a:p>
+        </p:txBody>
+      </p:sp>
+      <p:sp>
+        <p:nvSpPr>
+          <p:cNvPr id="7" name="箭號: 圓形 6">
+            <a:extLst>
+              <a:ext uri="{FF2B5EF4-FFF2-40B4-BE49-F238E27FC236}">
+                <a16:creationId xmlns:a16="http://schemas.microsoft.com/office/drawing/2014/main" id="{C116953C-BB31-43DD-9C1C-039943A5F0A7}"/>
+              </a:ext>
+            </a:extLst>
+          </p:cNvPr>
+          <p:cNvSpPr/>
+          <p:nvPr/>
+        </p:nvSpPr>
+        <p:spPr>
+          <a:xfrm rot="4118081" flipV="1">
+            <a:off x="1079272" y="1307471"/>
+            <a:ext cx="1659117" cy="1977522"/>
+          </a:xfrm>
+          <a:prstGeom prst="circularArrow">
+            <a:avLst>
+              <a:gd name="adj1" fmla="val 11321"/>
+              <a:gd name="adj2" fmla="val 3086677"/>
+              <a:gd name="adj3" fmla="val 20118481"/>
+              <a:gd name="adj4" fmla="val 15090728"/>
+              <a:gd name="adj5" fmla="val 20865"/>
+            </a:avLst>
+          </a:prstGeom>
+          <a:solidFill>
+            <a:schemeClr val="bg1">
+              <a:lumMod val="85000"/>
+              <a:lumOff val="15000"/>
+            </a:schemeClr>
+          </a:solidFill>
+          <a:ln>
+            <a:solidFill>
+              <a:srgbClr val="FFFF00"/>
+            </a:solidFill>
+          </a:ln>
+        </p:spPr>
+        <p:style>
+          <a:lnRef idx="2">
+            <a:schemeClr val="accent1">
+              <a:shade val="50000"/>
+            </a:schemeClr>
+          </a:lnRef>
+          <a:fillRef idx="1">
+            <a:schemeClr val="accent1"/>
+          </a:fillRef>
+          <a:effectRef idx="0">
+            <a:schemeClr val="accent1"/>
+          </a:effectRef>
+          <a:fontRef idx="minor">
+            <a:schemeClr val="lt1"/>
+          </a:fontRef>
+        </p:style>
+        <p:txBody>
+          <a:bodyPr rtlCol="0" anchor="ctr"/>
+          <a:lstStyle/>
+          <a:p>
+            <a:pPr algn="ctr"/>
+            <a:endParaRPr lang="zh-TW" altLang="en-US">
+              <a:solidFill>
+                <a:schemeClr val="tx1"/>
+              </a:solidFill>
+            </a:endParaRPr>
+          </a:p>
+        </p:txBody>
+      </p:sp>
+      <p:sp>
+        <p:nvSpPr>
+          <p:cNvPr id="8" name="橢圓 7">
+            <a:extLst>
+              <a:ext uri="{FF2B5EF4-FFF2-40B4-BE49-F238E27FC236}">
+                <a16:creationId xmlns:a16="http://schemas.microsoft.com/office/drawing/2014/main" id="{744F41F2-F37D-4ADC-8E0D-A35554360D66}"/>
+              </a:ext>
+            </a:extLst>
+          </p:cNvPr>
+          <p:cNvSpPr/>
+          <p:nvPr/>
+        </p:nvSpPr>
+        <p:spPr>
+          <a:xfrm>
+            <a:off x="2772282" y="3222264"/>
+            <a:ext cx="913598" cy="2301843"/>
+          </a:xfrm>
+          <a:prstGeom prst="ellipse">
+            <a:avLst/>
+          </a:prstGeom>
+          <a:noFill/>
+          <a:ln>
+            <a:solidFill>
+              <a:srgbClr val="FF0000"/>
+            </a:solidFill>
+          </a:ln>
+        </p:spPr>
+        <p:style>
+          <a:lnRef idx="2">
+            <a:schemeClr val="accent1">
+              <a:shade val="50000"/>
+            </a:schemeClr>
+          </a:lnRef>
+          <a:fillRef idx="1">
+            <a:schemeClr val="accent1"/>
+          </a:fillRef>
+          <a:effectRef idx="0">
+            <a:schemeClr val="accent1"/>
+          </a:effectRef>
+          <a:fontRef idx="minor">
+            <a:schemeClr val="lt1"/>
+          </a:fontRef>
+        </p:style>
+        <p:txBody>
+          <a:bodyPr rtlCol="0" anchor="ctr"/>
+          <a:lstStyle/>
+          <a:p>
+            <a:pPr algn="ctr"/>
+            <a:endParaRPr lang="zh-TW" altLang="en-US"/>
+          </a:p>
+        </p:txBody>
+      </p:sp>
+      <p:sp>
+        <p:nvSpPr>
+          <p:cNvPr id="9" name="橢圓 8">
+            <a:extLst>
+              <a:ext uri="{FF2B5EF4-FFF2-40B4-BE49-F238E27FC236}">
+                <a16:creationId xmlns:a16="http://schemas.microsoft.com/office/drawing/2014/main" id="{DF2E7FC2-B92E-4704-B212-D0911ECB0044}"/>
+              </a:ext>
+            </a:extLst>
+          </p:cNvPr>
+          <p:cNvSpPr/>
+          <p:nvPr/>
+        </p:nvSpPr>
+        <p:spPr>
+          <a:xfrm>
+            <a:off x="2398133" y="5456207"/>
+            <a:ext cx="986090" cy="476656"/>
+          </a:xfrm>
+          <a:prstGeom prst="ellipse">
+            <a:avLst/>
+          </a:prstGeom>
+          <a:noFill/>
+          <a:ln>
+            <a:solidFill>
+              <a:srgbClr val="FF0000"/>
+            </a:solidFill>
+          </a:ln>
+        </p:spPr>
+        <p:style>
+          <a:lnRef idx="2">
+            <a:schemeClr val="accent1">
+              <a:shade val="50000"/>
+            </a:schemeClr>
+          </a:lnRef>
+          <a:fillRef idx="1">
+            <a:schemeClr val="accent1"/>
+          </a:fillRef>
+          <a:effectRef idx="0">
+            <a:schemeClr val="accent1"/>
+          </a:effectRef>
+          <a:fontRef idx="minor">
+            <a:schemeClr val="lt1"/>
+          </a:fontRef>
+        </p:style>
+        <p:txBody>
+          <a:bodyPr rtlCol="0" anchor="ctr"/>
+          <a:lstStyle/>
+          <a:p>
+            <a:pPr algn="ctr"/>
+            <a:endParaRPr lang="zh-TW" altLang="en-US"/>
+          </a:p>
+        </p:txBody>
+      </p:sp>
+      <p:sp>
+        <p:nvSpPr>
+          <p:cNvPr id="10" name="文字方塊 9">
+            <a:extLst>
+              <a:ext uri="{FF2B5EF4-FFF2-40B4-BE49-F238E27FC236}">
+                <a16:creationId xmlns:a16="http://schemas.microsoft.com/office/drawing/2014/main" id="{C83F98A5-FBB7-4BCC-BAF8-47F091D6D4D9}"/>
+              </a:ext>
+            </a:extLst>
+          </p:cNvPr>
+          <p:cNvSpPr txBox="1"/>
+          <p:nvPr/>
+        </p:nvSpPr>
+        <p:spPr>
+          <a:xfrm>
+            <a:off x="3384223" y="3059667"/>
+            <a:ext cx="301686" cy="369332"/>
+          </a:xfrm>
+          <a:prstGeom prst="rect">
+            <a:avLst/>
+          </a:prstGeom>
+          <a:noFill/>
+        </p:spPr>
+        <p:txBody>
+          <a:bodyPr wrap="none" rtlCol="0">
+            <a:spAutoFit/>
+          </a:bodyPr>
+          <a:lstStyle/>
+          <a:p>
+            <a:r>
+              <a:rPr lang="en-US" altLang="zh-TW" dirty="0">
+                <a:solidFill>
+                  <a:srgbClr val="FF0000"/>
+                </a:solidFill>
+              </a:rPr>
+              <a:t>1</a:t>
+            </a:r>
+            <a:endParaRPr lang="zh-TW" altLang="en-US" dirty="0">
+              <a:solidFill>
+                <a:srgbClr val="FF0000"/>
+              </a:solidFill>
+            </a:endParaRPr>
+          </a:p>
+        </p:txBody>
+      </p:sp>
+      <p:sp>
+        <p:nvSpPr>
+          <p:cNvPr id="11" name="文字方塊 10">
+            <a:extLst>
+              <a:ext uri="{FF2B5EF4-FFF2-40B4-BE49-F238E27FC236}">
+                <a16:creationId xmlns:a16="http://schemas.microsoft.com/office/drawing/2014/main" id="{B3FEC73B-3756-4908-AB4D-972732B944FE}"/>
+              </a:ext>
+            </a:extLst>
+          </p:cNvPr>
+          <p:cNvSpPr txBox="1"/>
+          <p:nvPr/>
+        </p:nvSpPr>
+        <p:spPr>
+          <a:xfrm>
+            <a:off x="3264668" y="5748197"/>
+            <a:ext cx="301686" cy="369332"/>
+          </a:xfrm>
+          <a:prstGeom prst="rect">
+            <a:avLst/>
+          </a:prstGeom>
+          <a:noFill/>
+        </p:spPr>
+        <p:txBody>
+          <a:bodyPr wrap="none" rtlCol="0">
+            <a:spAutoFit/>
+          </a:bodyPr>
+          <a:lstStyle/>
+          <a:p>
+            <a:r>
+              <a:rPr lang="en-US" altLang="zh-TW" dirty="0">
+                <a:solidFill>
+                  <a:srgbClr val="FF0000"/>
+                </a:solidFill>
+              </a:rPr>
+              <a:t>2</a:t>
+            </a:r>
+            <a:endParaRPr lang="zh-TW" altLang="en-US" dirty="0">
+              <a:solidFill>
+                <a:srgbClr val="FF0000"/>
+              </a:solidFill>
+            </a:endParaRPr>
+          </a:p>
+        </p:txBody>
+      </p:sp>
+      <p:sp>
+        <p:nvSpPr>
+          <p:cNvPr id="12" name="圖說文字: 直線加上框線和強調線 11">
+            <a:extLst>
+              <a:ext uri="{FF2B5EF4-FFF2-40B4-BE49-F238E27FC236}">
+                <a16:creationId xmlns:a16="http://schemas.microsoft.com/office/drawing/2014/main" id="{128831AE-FA3F-4246-901C-D7F5577ACD92}"/>
+              </a:ext>
+            </a:extLst>
+          </p:cNvPr>
+          <p:cNvSpPr/>
+          <p:nvPr/>
+        </p:nvSpPr>
+        <p:spPr>
+          <a:xfrm>
+            <a:off x="6576767" y="5364781"/>
+            <a:ext cx="2639506" cy="735291"/>
+          </a:xfrm>
+          <a:prstGeom prst="accentBorderCallout1">
+            <a:avLst>
+              <a:gd name="adj1" fmla="val 18750"/>
+              <a:gd name="adj2" fmla="val -8333"/>
+              <a:gd name="adj3" fmla="val -84936"/>
+              <a:gd name="adj4" fmla="val -37976"/>
+            </a:avLst>
+          </a:prstGeom>
+        </p:spPr>
+        <p:style>
+          <a:lnRef idx="2">
+            <a:schemeClr val="accent5"/>
+          </a:lnRef>
+          <a:fillRef idx="1">
+            <a:schemeClr val="lt1"/>
+          </a:fillRef>
+          <a:effectRef idx="0">
+            <a:schemeClr val="accent5"/>
+          </a:effectRef>
+          <a:fontRef idx="minor">
+            <a:schemeClr val="dk1"/>
+          </a:fontRef>
+        </p:style>
+        <p:txBody>
+          <a:bodyPr rot="0" spcFirstLastPara="0" vertOverflow="overflow" horzOverflow="overflow" vert="horz" wrap="square" lIns="91440" tIns="45720" rIns="91440" bIns="45720" numCol="1" spcCol="0" rtlCol="0" fromWordArt="0" anchor="ctr" anchorCtr="0" forceAA="0" compatLnSpc="1">
+            <a:prstTxWarp prst="textNoShape">
+              <a:avLst/>
+            </a:prstTxWarp>
+            <a:noAutofit/>
+          </a:bodyPr>
+          <a:lstStyle/>
+          <a:p>
+            <a:pPr algn="ctr"/>
+            <a:r>
+              <a:rPr lang="zh-TW" altLang="en-US" dirty="0">
+                <a:ln w="0"/>
+                <a:solidFill>
+                  <a:srgbClr val="FF0000"/>
+                </a:solidFill>
+                <a:effectLst>
+                  <a:outerShdw blurRad="38100" dist="19050" dir="2700000" algn="tl" rotWithShape="0">
+                    <a:schemeClr val="dk1">
+                      <a:alpha val="40000"/>
+                    </a:schemeClr>
+                  </a:outerShdw>
+                </a:effectLst>
+              </a:rPr>
+              <a:t>最多</a:t>
+            </a:r>
+            <a:r>
+              <a:rPr lang="en-US" altLang="zh-TW" dirty="0">
+                <a:ln w="0"/>
+                <a:solidFill>
+                  <a:srgbClr val="FF0000"/>
+                </a:solidFill>
+                <a:effectLst>
+                  <a:outerShdw blurRad="38100" dist="19050" dir="2700000" algn="tl" rotWithShape="0">
+                    <a:schemeClr val="dk1">
+                      <a:alpha val="40000"/>
+                    </a:schemeClr>
+                  </a:outerShdw>
+                </a:effectLst>
+              </a:rPr>
+              <a:t>50</a:t>
+            </a:r>
+            <a:r>
+              <a:rPr lang="zh-TW" altLang="en-US" dirty="0">
+                <a:ln w="0"/>
+                <a:solidFill>
+                  <a:srgbClr val="FF0000"/>
+                </a:solidFill>
+                <a:effectLst>
+                  <a:outerShdw blurRad="38100" dist="19050" dir="2700000" algn="tl" rotWithShape="0">
+                    <a:schemeClr val="dk1">
+                      <a:alpha val="40000"/>
+                    </a:schemeClr>
+                  </a:outerShdw>
+                </a:effectLst>
+              </a:rPr>
+              <a:t>筆歷史紀錄</a:t>
+            </a:r>
+          </a:p>
+        </p:txBody>
+      </p:sp>
+    </p:spTree>
+    <p:extLst>
+      <p:ext uri="{BB962C8B-B14F-4D97-AF65-F5344CB8AC3E}">
+        <p14:creationId xmlns:p14="http://schemas.microsoft.com/office/powerpoint/2010/main" val="3646076361"/>
+      </p:ext>
+    </p:extLst>
+  </p:cSld>
+  <p:clrMapOvr>
+    <a:masterClrMapping/>
+  </p:clrMapOvr>
+</p:sld>
+</file>
+
+<file path=ppt/slides/slide9.xml><?xml version="1.0" encoding="utf-8"?>
+<p:sld xmlns:a="http://schemas.openxmlformats.org/drawingml/2006/main" xmlns:r="http://schemas.openxmlformats.org/officeDocument/2006/relationships" xmlns:p="http://schemas.openxmlformats.org/presentationml/2006/main">
+  <p:cSld>
+    <p:spTree>
+      <p:nvGrpSpPr>
+        <p:cNvPr id="1" name=""/>
+        <p:cNvGrpSpPr/>
+        <p:nvPr/>
+      </p:nvGrpSpPr>
+      <p:grpSpPr>
+        <a:xfrm>
+          <a:off x="0" y="0"/>
+          <a:ext cx="0" cy="0"/>
+          <a:chOff x="0" y="0"/>
+          <a:chExt cx="0" cy="0"/>
+        </a:xfrm>
+      </p:grpSpPr>
+      <p:sp>
+        <p:nvSpPr>
+          <p:cNvPr id="2" name="標題 1">
+            <a:extLst>
+              <a:ext uri="{FF2B5EF4-FFF2-40B4-BE49-F238E27FC236}">
+                <a16:creationId xmlns:a16="http://schemas.microsoft.com/office/drawing/2014/main" id="{0B01E220-A1E5-422C-9122-A1DA2F88A2A4}"/>
+              </a:ext>
+            </a:extLst>
+          </p:cNvPr>
+          <p:cNvSpPr>
+            <a:spLocks noGrp="1"/>
+          </p:cNvSpPr>
+          <p:nvPr>
+            <p:ph type="title"/>
+          </p:nvPr>
+        </p:nvSpPr>
+        <p:spPr/>
+        <p:txBody>
+          <a:bodyPr/>
+          <a:lstStyle/>
+          <a:p>
+            <a:r>
+              <a:rPr lang="zh-TW" altLang="en-US" dirty="0"/>
+              <a:t>附錄</a:t>
+            </a:r>
+            <a:r>
+              <a:rPr lang="en-US" altLang="zh-TW" dirty="0"/>
+              <a:t>:</a:t>
+            </a:r>
+            <a:r>
+              <a:rPr lang="zh-TW" altLang="en-US" dirty="0"/>
+              <a:t> 加分時機</a:t>
+            </a:r>
+          </a:p>
+        </p:txBody>
+      </p:sp>
+      <p:sp>
+        <p:nvSpPr>
+          <p:cNvPr id="3" name="內容版面配置區 2">
+            <a:extLst>
+              <a:ext uri="{FF2B5EF4-FFF2-40B4-BE49-F238E27FC236}">
+                <a16:creationId xmlns:a16="http://schemas.microsoft.com/office/drawing/2014/main" id="{B8C0F95A-1E94-43A9-B8E7-4ADB175F7332}"/>
+              </a:ext>
+            </a:extLst>
+          </p:cNvPr>
+          <p:cNvSpPr>
+            <a:spLocks noGrp="1"/>
+          </p:cNvSpPr>
+          <p:nvPr>
+            <p:ph idx="1"/>
+          </p:nvPr>
+        </p:nvSpPr>
+        <p:spPr/>
+        <p:txBody>
+          <a:bodyPr anchor="t"/>
+          <a:lstStyle/>
+          <a:p>
+            <a:pPr marL="342900" indent="-342900">
+              <a:buFont typeface="+mj-lt"/>
+              <a:buAutoNum type="arabicPeriod"/>
+            </a:pPr>
+            <a:r>
+              <a:rPr lang="zh-TW" altLang="en-US" sz="3200" dirty="0"/>
+              <a:t>小福的上台發言</a:t>
+            </a:r>
+            <a:endParaRPr lang="en-US" altLang="zh-TW" sz="3200" dirty="0"/>
+          </a:p>
+          <a:p>
+            <a:pPr marL="342900" indent="-342900">
+              <a:buFont typeface="+mj-lt"/>
+              <a:buAutoNum type="arabicPeriod"/>
+            </a:pPr>
+            <a:r>
+              <a:rPr lang="en-US" altLang="zh-TW" sz="3200" dirty="0"/>
+              <a:t>Makerspace</a:t>
+            </a:r>
+          </a:p>
+          <a:p>
+            <a:pPr marL="342900" indent="-342900">
+              <a:buFont typeface="+mj-lt"/>
+              <a:buAutoNum type="arabicPeriod"/>
+            </a:pPr>
+            <a:r>
+              <a:rPr lang="en-US" altLang="zh-TW" sz="3200" dirty="0"/>
+              <a:t>RPG</a:t>
+            </a:r>
+            <a:r>
+              <a:rPr lang="zh-TW" altLang="en-US" sz="3200" dirty="0"/>
+              <a:t>隱藏人物</a:t>
+            </a:r>
+            <a:r>
+              <a:rPr lang="en-US" altLang="zh-TW" sz="3200" dirty="0"/>
+              <a:t>(?)</a:t>
+            </a:r>
+          </a:p>
+          <a:p>
+            <a:pPr marL="342900" indent="-342900">
+              <a:buFont typeface="+mj-lt"/>
+              <a:buAutoNum type="arabicPeriod"/>
+            </a:pPr>
+            <a:r>
+              <a:rPr lang="zh-TW" altLang="en-US" sz="3200" dirty="0"/>
+              <a:t>黑客松問關主問題</a:t>
+            </a:r>
+            <a:endParaRPr lang="en-US" altLang="zh-TW" sz="3200" dirty="0"/>
+          </a:p>
+          <a:p>
+            <a:pPr marL="342900" indent="-342900">
+              <a:buFont typeface="+mj-lt"/>
+              <a:buAutoNum type="arabicPeriod"/>
+            </a:pPr>
+            <a:endParaRPr lang="zh-TW" altLang="en-US" dirty="0"/>
+          </a:p>
+        </p:txBody>
+      </p:sp>
+    </p:spTree>
+    <p:extLst>
+      <p:ext uri="{BB962C8B-B14F-4D97-AF65-F5344CB8AC3E}">
+        <p14:creationId xmlns:p14="http://schemas.microsoft.com/office/powerpoint/2010/main" val="76887069"/>
       </p:ext>
     </p:extLst>
   </p:cSld>

</xml_diff>